<commit_message>
Make clear we don't know the distance
</commit_message>
<xml_diff>
--- a/docs/09_machine_learning/002_gradient_descent/assets/setup.pptx
+++ b/docs/09_machine_learning/002_gradient_descent/assets/setup.pptx
@@ -104,7 +104,41 @@
       </a:defRPr>
     </a:lvl9pPr>
   </p:defaultTextStyle>
+  <p:extLst>
+    <p:ext uri="{EFAFB233-063F-42B5-8137-9DF3F51BA10A}">
+      <p15:sldGuideLst xmlns:p15="http://schemas.microsoft.com/office/powerpoint/2012/main"/>
+    </p:ext>
+  </p:extLst>
 </p:presentation>
+</file>
+
+<file path=ppt/changesInfos/changesInfo1.xml><?xml version="1.0" encoding="utf-8"?>
+<pc:chgInfo xmlns:a="http://schemas.openxmlformats.org/drawingml/2006/main" xmlns:r="http://schemas.openxmlformats.org/officeDocument/2006/relationships" xmlns:ac="http://schemas.microsoft.com/office/drawing/2013/main/command" xmlns:pc="http://schemas.microsoft.com/office/powerpoint/2013/main/command">
+  <pc:docChgLst>
+    <pc:chgData name="Philippe Baucour" userId="5102170ae7533958" providerId="LiveId" clId="{C4634EC1-E8DC-4FAE-B843-C9AE3C4956A0}"/>
+    <pc:docChg chg="modSld">
+      <pc:chgData name="Philippe Baucour" userId="5102170ae7533958" providerId="LiveId" clId="{C4634EC1-E8DC-4FAE-B843-C9AE3C4956A0}" dt="2025-11-22T09:44:35.895" v="5" actId="20577"/>
+      <pc:docMkLst>
+        <pc:docMk/>
+      </pc:docMkLst>
+      <pc:sldChg chg="modSp mod">
+        <pc:chgData name="Philippe Baucour" userId="5102170ae7533958" providerId="LiveId" clId="{C4634EC1-E8DC-4FAE-B843-C9AE3C4956A0}" dt="2025-11-22T09:44:35.895" v="5" actId="20577"/>
+        <pc:sldMkLst>
+          <pc:docMk/>
+          <pc:sldMk cId="3075318298" sldId="256"/>
+        </pc:sldMkLst>
+        <pc:spChg chg="mod">
+          <ac:chgData name="Philippe Baucour" userId="5102170ae7533958" providerId="LiveId" clId="{C4634EC1-E8DC-4FAE-B843-C9AE3C4956A0}" dt="2025-11-22T09:44:35.895" v="5" actId="20577"/>
+          <ac:spMkLst>
+            <pc:docMk/>
+            <pc:sldMk cId="3075318298" sldId="256"/>
+            <ac:spMk id="33" creationId="{C30B71E3-E20B-F7F9-8EF7-4996D72E2DDF}"/>
+          </ac:spMkLst>
+        </pc:spChg>
+      </pc:sldChg>
+    </pc:docChg>
+  </pc:docChgLst>
+</pc:chgInfo>
 </file>
 
 <file path=ppt/slideLayouts/slideLayout1.xml><?xml version="1.0" encoding="utf-8"?>
@@ -254,7 +288,7 @@
           <a:p>
             <a:fld id="{2D3BE058-CAA6-442E-81C9-ED1747644904}" type="datetimeFigureOut">
               <a:rPr lang="fr-FR" smtClean="0"/>
-              <a:t>20/11/2025</a:t>
+              <a:t>22/11/2025</a:t>
             </a:fld>
             <a:endParaRPr lang="fr-FR"/>
           </a:p>
@@ -452,7 +486,7 @@
           <a:p>
             <a:fld id="{2D3BE058-CAA6-442E-81C9-ED1747644904}" type="datetimeFigureOut">
               <a:rPr lang="fr-FR" smtClean="0"/>
-              <a:t>20/11/2025</a:t>
+              <a:t>22/11/2025</a:t>
             </a:fld>
             <a:endParaRPr lang="fr-FR"/>
           </a:p>
@@ -660,7 +694,7 @@
           <a:p>
             <a:fld id="{2D3BE058-CAA6-442E-81C9-ED1747644904}" type="datetimeFigureOut">
               <a:rPr lang="fr-FR" smtClean="0"/>
-              <a:t>20/11/2025</a:t>
+              <a:t>22/11/2025</a:t>
             </a:fld>
             <a:endParaRPr lang="fr-FR"/>
           </a:p>
@@ -858,7 +892,7 @@
           <a:p>
             <a:fld id="{2D3BE058-CAA6-442E-81C9-ED1747644904}" type="datetimeFigureOut">
               <a:rPr lang="fr-FR" smtClean="0"/>
-              <a:t>20/11/2025</a:t>
+              <a:t>22/11/2025</a:t>
             </a:fld>
             <a:endParaRPr lang="fr-FR"/>
           </a:p>
@@ -1133,7 +1167,7 @@
           <a:p>
             <a:fld id="{2D3BE058-CAA6-442E-81C9-ED1747644904}" type="datetimeFigureOut">
               <a:rPr lang="fr-FR" smtClean="0"/>
-              <a:t>20/11/2025</a:t>
+              <a:t>22/11/2025</a:t>
             </a:fld>
             <a:endParaRPr lang="fr-FR"/>
           </a:p>
@@ -1398,7 +1432,7 @@
           <a:p>
             <a:fld id="{2D3BE058-CAA6-442E-81C9-ED1747644904}" type="datetimeFigureOut">
               <a:rPr lang="fr-FR" smtClean="0"/>
-              <a:t>20/11/2025</a:t>
+              <a:t>22/11/2025</a:t>
             </a:fld>
             <a:endParaRPr lang="fr-FR"/>
           </a:p>
@@ -1810,7 +1844,7 @@
           <a:p>
             <a:fld id="{2D3BE058-CAA6-442E-81C9-ED1747644904}" type="datetimeFigureOut">
               <a:rPr lang="fr-FR" smtClean="0"/>
-              <a:t>20/11/2025</a:t>
+              <a:t>22/11/2025</a:t>
             </a:fld>
             <a:endParaRPr lang="fr-FR"/>
           </a:p>
@@ -1951,7 +1985,7 @@
           <a:p>
             <a:fld id="{2D3BE058-CAA6-442E-81C9-ED1747644904}" type="datetimeFigureOut">
               <a:rPr lang="fr-FR" smtClean="0"/>
-              <a:t>20/11/2025</a:t>
+              <a:t>22/11/2025</a:t>
             </a:fld>
             <a:endParaRPr lang="fr-FR"/>
           </a:p>
@@ -2064,7 +2098,7 @@
           <a:p>
             <a:fld id="{2D3BE058-CAA6-442E-81C9-ED1747644904}" type="datetimeFigureOut">
               <a:rPr lang="fr-FR" smtClean="0"/>
-              <a:t>20/11/2025</a:t>
+              <a:t>22/11/2025</a:t>
             </a:fld>
             <a:endParaRPr lang="fr-FR"/>
           </a:p>
@@ -2375,7 +2409,7 @@
           <a:p>
             <a:fld id="{2D3BE058-CAA6-442E-81C9-ED1747644904}" type="datetimeFigureOut">
               <a:rPr lang="fr-FR" smtClean="0"/>
-              <a:t>20/11/2025</a:t>
+              <a:t>22/11/2025</a:t>
             </a:fld>
             <a:endParaRPr lang="fr-FR"/>
           </a:p>
@@ -2663,7 +2697,7 @@
           <a:p>
             <a:fld id="{2D3BE058-CAA6-442E-81C9-ED1747644904}" type="datetimeFigureOut">
               <a:rPr lang="fr-FR" smtClean="0"/>
-              <a:t>20/11/2025</a:t>
+              <a:t>22/11/2025</a:t>
             </a:fld>
             <a:endParaRPr lang="fr-FR"/>
           </a:p>
@@ -2904,7 +2938,7 @@
           <a:p>
             <a:fld id="{2D3BE058-CAA6-442E-81C9-ED1747644904}" type="datetimeFigureOut">
               <a:rPr lang="fr-FR" smtClean="0"/>
-              <a:t>20/11/2025</a:t>
+              <a:t>22/11/2025</a:t>
             </a:fld>
             <a:endParaRPr lang="fr-FR"/>
           </a:p>
@@ -3994,8 +4028,26 @@
                 <a:latin typeface="Courier New" panose="02070309020205020404" pitchFamily="49" charset="0"/>
                 <a:cs typeface="Courier New" panose="02070309020205020404" pitchFamily="49" charset="0"/>
               </a:rPr>
-              <a:t>d = 300cm</a:t>
-            </a:r>
+              <a:t>d = </a:t>
+            </a:r>
+            <a:r>
+              <a:rPr lang="en-US" sz="1050">
+                <a:latin typeface="Courier New" panose="02070309020205020404" pitchFamily="49" charset="0"/>
+                <a:cs typeface="Courier New" panose="02070309020205020404" pitchFamily="49" charset="0"/>
+              </a:rPr>
+              <a:t>???</a:t>
+            </a:r>
+            <a:r>
+              <a:rPr lang="en-US" sz="1050" noProof="0">
+                <a:latin typeface="Courier New" panose="02070309020205020404" pitchFamily="49" charset="0"/>
+                <a:cs typeface="Courier New" panose="02070309020205020404" pitchFamily="49" charset="0"/>
+              </a:rPr>
+              <a:t>cm</a:t>
+            </a:r>
+            <a:endParaRPr lang="en-US" sz="1050" noProof="0" dirty="0">
+              <a:latin typeface="Courier New" panose="02070309020205020404" pitchFamily="49" charset="0"/>
+              <a:cs typeface="Courier New" panose="02070309020205020404" pitchFamily="49" charset="0"/>
+            </a:endParaRPr>
           </a:p>
         </p:txBody>
       </p:sp>

</xml_diff>